<commit_message>
updating ppt for data files
</commit_message>
<xml_diff>
--- a/Class11_django_templates2/django_templates_part2.pptx
+++ b/Class11_django_templates2/django_templates_part2.pptx
@@ -6222,7 +6222,7 @@
         <p:spPr/>
         <p:txBody>
           <a:bodyPr>
-            <a:normAutofit/>
+            <a:normAutofit lnSpcReduction="10000"/>
           </a:bodyPr>
           <a:lstStyle/>
           <a:p>
@@ -6250,20 +6250,24 @@
               <a:rPr lang="en-US" dirty="0">
                 <a:hlinkClick r:id="rId2"/>
               </a:rPr>
-              <a:t>http://steventking.com/clients/</a:t>
+              <a:t>https://raw.github.com/steven-king/django-teaching-roster/master/data_jsons/</a:t>
             </a:r>
             <a:r>
               <a:rPr lang="en-US" dirty="0" smtClean="0">
                 <a:hlinkClick r:id="rId2"/>
               </a:rPr>
-              <a:t>data_students_withimage.json</a:t>
+              <a:t>data_students_image.json</a:t>
             </a:r>
             <a:endParaRPr lang="en-US" dirty="0" smtClean="0"/>
           </a:p>
           <a:p>
             <a:r>
               <a:rPr lang="en-US" dirty="0" smtClean="0"/>
-              <a:t>Change Models, Dump DB, Sync DB, Add to Views, Add to template</a:t>
+              <a:t>Change </a:t>
+            </a:r>
+            <a:r>
+              <a:rPr lang="en-US" dirty="0" smtClean="0"/>
+              <a:t>Models, Dump DB, Sync DB, Add to Views, Add to template</a:t>
             </a:r>
           </a:p>
           <a:p>
@@ -6769,7 +6773,23 @@
           <a:p>
             <a:r>
               <a:rPr lang="en-US" dirty="0" smtClean="0"/>
-              <a:t>curl http://twitter.github.com/bootstrap/assets/bootstrap.zip &gt; </a:t>
+              <a:t>curl </a:t>
+            </a:r>
+            <a:r>
+              <a:rPr lang="en-US" dirty="0">
+                <a:hlinkClick r:id="rId2"/>
+              </a:rPr>
+              <a:t>https://github.com/twbs/bootstrap/releases/download/v3.1.1/bootstrap-3.1.1-</a:t>
+            </a:r>
+            <a:r>
+              <a:rPr lang="en-US" dirty="0" smtClean="0">
+                <a:hlinkClick r:id="rId2"/>
+              </a:rPr>
+              <a:t>dist.zip</a:t>
+            </a:r>
+            <a:r>
+              <a:rPr lang="en-US" dirty="0" smtClean="0"/>
+              <a:t> &gt; </a:t>
             </a:r>
             <a:r>
               <a:rPr lang="en-US" dirty="0" err="1" smtClean="0"/>
@@ -6788,7 +6808,7 @@
           <p:nvPr/>
         </p:nvPicPr>
         <p:blipFill>
-          <a:blip r:embed="rId2">
+          <a:blip r:embed="rId3">
             <a:extLst>
               <a:ext uri="{28A0092B-C50C-407E-A947-70E740481C1C}">
                 <a14:useLocalDpi xmlns:a14="http://schemas.microsoft.com/office/drawing/2010/main" val="0"/>
@@ -6801,7 +6821,7 @@
         </p:blipFill>
         <p:spPr>
           <a:xfrm>
-            <a:off x="0" y="3471829"/>
+            <a:off x="0" y="3813737"/>
             <a:ext cx="9144000" cy="3744405"/>
           </a:xfrm>
           <a:prstGeom prst="rect">

</xml_diff>